<commit_message>
correction d'une faute de conjugaison
</commit_message>
<xml_diff>
--- a/docs/rapport/diapopresdebut (1).pptx
+++ b/docs/rapport/diapopresdebut (1).pptx
@@ -6239,12 +6239,12 @@
               </a:lnSpc>
             </a:pPr>
             <a:r>
-              <a:rPr lang="fr-FR" sz="1300">
+              <a:rPr lang="fr-FR" sz="1300" dirty="0">
                 <a:solidFill>
                   <a:schemeClr val="tx1"/>
                 </a:solidFill>
               </a:rPr>
-              <a:t>VILMARD Alexis</a:t>
+              <a:t>BERNHARD William</a:t>
             </a:r>
           </a:p>
           <a:p>
@@ -6254,12 +6254,12 @@
               </a:lnSpc>
             </a:pPr>
             <a:r>
-              <a:rPr lang="fr-FR" sz="1300">
+              <a:rPr lang="fr-FR" sz="1300" dirty="0">
                 <a:solidFill>
                   <a:schemeClr val="tx1"/>
                 </a:solidFill>
               </a:rPr>
-              <a:t>BERNHARD William</a:t>
+              <a:t>GUILLOU Aurélien</a:t>
             </a:r>
           </a:p>
           <a:p>
@@ -6269,12 +6269,12 @@
               </a:lnSpc>
             </a:pPr>
             <a:r>
-              <a:rPr lang="fr-FR" sz="1300">
+              <a:rPr lang="fr-FR" sz="1300" dirty="0">
                 <a:solidFill>
                   <a:schemeClr val="tx1"/>
                 </a:solidFill>
               </a:rPr>
-              <a:t>GUILLOU Aurélien</a:t>
+              <a:t>HEIDET Lucas</a:t>
             </a:r>
           </a:p>
           <a:p>
@@ -6284,12 +6284,12 @@
               </a:lnSpc>
             </a:pPr>
             <a:r>
-              <a:rPr lang="fr-FR" sz="1300">
+              <a:rPr lang="fr-FR" sz="1300" dirty="0">
                 <a:solidFill>
                   <a:schemeClr val="tx1"/>
                 </a:solidFill>
               </a:rPr>
-              <a:t>HEIDET Lucas</a:t>
+              <a:t>TROGNOT Mathias</a:t>
             </a:r>
           </a:p>
           <a:p>
@@ -6299,13 +6299,25 @@
               </a:lnSpc>
             </a:pPr>
             <a:r>
-              <a:rPr lang="fr-FR" sz="1300">
+              <a:rPr lang="fr-FR" sz="1300" dirty="0">
                 <a:solidFill>
                   <a:schemeClr val="tx1"/>
                 </a:solidFill>
               </a:rPr>
-              <a:t>TROGNOT Mathias</a:t>
-            </a:r>
+              <a:t>VILMARD Alexis</a:t>
+            </a:r>
+          </a:p>
+          <a:p>
+            <a:pPr>
+              <a:lnSpc>
+                <a:spcPct val="90000"/>
+              </a:lnSpc>
+            </a:pPr>
+            <a:endParaRPr lang="fr-FR" sz="1300" dirty="0">
+              <a:solidFill>
+                <a:schemeClr val="tx1"/>
+              </a:solidFill>
+            </a:endParaRPr>
           </a:p>
         </p:txBody>
       </p:sp>
@@ -6390,7 +6402,15 @@
           <a:p>
             <a:r>
               <a:rPr lang="fr-FR" dirty="0"/>
-              <a:t>Présentation du jeu choisie</a:t>
+              <a:t>Présentation </a:t>
+            </a:r>
+            <a:r>
+              <a:rPr lang="fr-FR"/>
+              <a:t>du jeu </a:t>
+            </a:r>
+            <a:r>
+              <a:rPr lang="fr-FR" dirty="0"/>
+              <a:t>choisi</a:t>
             </a:r>
           </a:p>
           <a:p>

</xml_diff>